<commit_message>
fixed arrow, slide 3
</commit_message>
<xml_diff>
--- a/end_products/RLadies_Parameterized_Reports.pptx
+++ b/end_products/RLadies_Parameterized_Reports.pptx
@@ -122,6 +122,11 @@
       </a:defRPr>
     </a:lvl9pPr>
   </p:defaultTextStyle>
+  <p:extLst>
+    <p:ext uri="{EFAFB233-063F-42B5-8137-9DF3F51BA10A}">
+      <p15:sldGuideLst xmlns:p15="http://schemas.microsoft.com/office/powerpoint/2012/main"/>
+    </p:ext>
+  </p:extLst>
 </p:presentation>
 </file>
 
@@ -351,7 +356,7 @@
           <a:p>
             <a:fld id="{3F9519AD-8476-4DB6-AE0D-55E88FE5B0A7}" type="datetimeFigureOut">
               <a:rPr lang="en-US" smtClean="0"/>
-              <a:t>9/9/2019</a:t>
+              <a:t>9/10/2019</a:t>
             </a:fld>
             <a:endParaRPr lang="en-US"/>
           </a:p>
@@ -559,7 +564,7 @@
           <a:p>
             <a:fld id="{3F9519AD-8476-4DB6-AE0D-55E88FE5B0A7}" type="datetimeFigureOut">
               <a:rPr lang="en-US" smtClean="0"/>
-              <a:t>9/9/2019</a:t>
+              <a:t>9/10/2019</a:t>
             </a:fld>
             <a:endParaRPr lang="en-US"/>
           </a:p>
@@ -815,7 +820,7 @@
           <a:p>
             <a:fld id="{3F9519AD-8476-4DB6-AE0D-55E88FE5B0A7}" type="datetimeFigureOut">
               <a:rPr lang="en-US" smtClean="0"/>
-              <a:t>9/9/2019</a:t>
+              <a:t>9/10/2019</a:t>
             </a:fld>
             <a:endParaRPr lang="en-US"/>
           </a:p>
@@ -989,7 +994,7 @@
           <a:p>
             <a:fld id="{3F9519AD-8476-4DB6-AE0D-55E88FE5B0A7}" type="datetimeFigureOut">
               <a:rPr lang="en-US" smtClean="0"/>
-              <a:t>9/9/2019</a:t>
+              <a:t>9/10/2019</a:t>
             </a:fld>
             <a:endParaRPr lang="en-US"/>
           </a:p>
@@ -1332,7 +1337,7 @@
           <a:p>
             <a:fld id="{3F9519AD-8476-4DB6-AE0D-55E88FE5B0A7}" type="datetimeFigureOut">
               <a:rPr lang="en-US" smtClean="0"/>
-              <a:t>9/9/2019</a:t>
+              <a:t>9/10/2019</a:t>
             </a:fld>
             <a:endParaRPr lang="en-US"/>
           </a:p>
@@ -1607,7 +1612,7 @@
           <a:p>
             <a:fld id="{3F9519AD-8476-4DB6-AE0D-55E88FE5B0A7}" type="datetimeFigureOut">
               <a:rPr lang="en-US" smtClean="0"/>
-              <a:t>9/9/2019</a:t>
+              <a:t>9/10/2019</a:t>
             </a:fld>
             <a:endParaRPr lang="en-US"/>
           </a:p>
@@ -1986,7 +1991,7 @@
           <a:p>
             <a:fld id="{3F9519AD-8476-4DB6-AE0D-55E88FE5B0A7}" type="datetimeFigureOut">
               <a:rPr lang="en-US" smtClean="0"/>
-              <a:t>9/9/2019</a:t>
+              <a:t>9/10/2019</a:t>
             </a:fld>
             <a:endParaRPr lang="en-US"/>
           </a:p>
@@ -2104,7 +2109,7 @@
           <a:p>
             <a:fld id="{3F9519AD-8476-4DB6-AE0D-55E88FE5B0A7}" type="datetimeFigureOut">
               <a:rPr lang="en-US" smtClean="0"/>
-              <a:t>9/9/2019</a:t>
+              <a:t>9/10/2019</a:t>
             </a:fld>
             <a:endParaRPr lang="en-US"/>
           </a:p>
@@ -2275,7 +2280,7 @@
           <a:p>
             <a:fld id="{3F9519AD-8476-4DB6-AE0D-55E88FE5B0A7}" type="datetimeFigureOut">
               <a:rPr lang="en-US" smtClean="0"/>
-              <a:t>9/9/2019</a:t>
+              <a:t>9/10/2019</a:t>
             </a:fld>
             <a:endParaRPr lang="en-US"/>
           </a:p>
@@ -2629,7 +2634,7 @@
           <a:p>
             <a:fld id="{3F9519AD-8476-4DB6-AE0D-55E88FE5B0A7}" type="datetimeFigureOut">
               <a:rPr lang="en-US" smtClean="0"/>
-              <a:t>9/9/2019</a:t>
+              <a:t>9/10/2019</a:t>
             </a:fld>
             <a:endParaRPr lang="en-US"/>
           </a:p>
@@ -3011,7 +3016,7 @@
           <a:p>
             <a:fld id="{3F9519AD-8476-4DB6-AE0D-55E88FE5B0A7}" type="datetimeFigureOut">
               <a:rPr lang="en-US" smtClean="0"/>
-              <a:t>9/9/2019</a:t>
+              <a:t>9/10/2019</a:t>
             </a:fld>
             <a:endParaRPr lang="en-US"/>
           </a:p>
@@ -3298,7 +3303,7 @@
           <a:p>
             <a:fld id="{3F9519AD-8476-4DB6-AE0D-55E88FE5B0A7}" type="datetimeFigureOut">
               <a:rPr lang="en-US" smtClean="0"/>
-              <a:t>9/9/2019</a:t>
+              <a:t>9/10/2019</a:t>
             </a:fld>
             <a:endParaRPr lang="en-US"/>
           </a:p>
@@ -6707,8 +6712,8 @@
         </p:nvSpPr>
         <p:spPr>
           <a:xfrm rot="10800000">
-            <a:off x="2111189" y="4262717"/>
-            <a:ext cx="7498078" cy="1794593"/>
+            <a:off x="3943846" y="4592342"/>
+            <a:ext cx="6042989" cy="1549686"/>
           </a:xfrm>
           <a:prstGeom prst="curvedDownArrow">
             <a:avLst/>

</xml_diff>